<commit_message>
Deployed 02f4046 with MkDocs version: 1.5.3
</commit_message>
<xml_diff>
--- a/slides/Unit1_What is a Program.pptx
+++ b/slides/Unit1_What is a Program.pptx
@@ -190,6 +190,22 @@
 
 <file path=ppt/changesInfos/changesInfo1.xml><?xml version="1.0" encoding="utf-8"?>
 <pc:chgInfo xmlns:a="http://schemas.openxmlformats.org/drawingml/2006/main" xmlns:r="http://schemas.openxmlformats.org/officeDocument/2006/relationships" xmlns:ac="http://schemas.microsoft.com/office/drawing/2013/main/command" xmlns:pc="http://schemas.microsoft.com/office/powerpoint/2013/main/command">
+  <pc:docChgLst>
+    <pc:chgData name="Zhao Jin" userId="cd05a825-544c-438a-9ba1-08e63db50b47" providerId="ADAL" clId="{C6011139-5AD4-4390-966D-584519836364}"/>
+    <pc:docChg chg="custSel modSld">
+      <pc:chgData name="Zhao Jin" userId="cd05a825-544c-438a-9ba1-08e63db50b47" providerId="ADAL" clId="{C6011139-5AD4-4390-966D-584519836364}" dt="2024-01-16T04:34:54.226" v="1" actId="368"/>
+      <pc:docMkLst>
+        <pc:docMk/>
+      </pc:docMkLst>
+      <pc:sldChg chg="modNotes">
+        <pc:chgData name="Zhao Jin" userId="cd05a825-544c-438a-9ba1-08e63db50b47" providerId="ADAL" clId="{C6011139-5AD4-4390-966D-584519836364}" dt="2024-01-16T04:34:54.226" v="1" actId="368"/>
+        <pc:sldMkLst>
+          <pc:docMk/>
+          <pc:sldMk cId="3535187164" sldId="470"/>
+        </pc:sldMkLst>
+      </pc:sldChg>
+    </pc:docChg>
+  </pc:docChgLst>
   <pc:docChgLst>
     <pc:chgData name="Zhao Jin" userId="cd05a825-544c-438a-9ba1-08e63db50b47" providerId="ADAL" clId="{C1150876-C2EA-4977-9983-106159090F19}"/>
     <pc:docChg chg="undo custSel modSld">
@@ -4893,10 +4909,7 @@
           <a:lstStyle/>
           <a:p>
             <a:pPr eaLnBrk="1" hangingPunct="1"/>
-            <a:r>
-              <a:rPr lang="en-US" dirty="0"/>
-              <a:t>~9000 Programming languages created in the history of programming. A few hundreds in active use.</a:t>
-            </a:r>
+            <a:endParaRPr lang="en-US" dirty="0"/>
           </a:p>
         </p:txBody>
       </p:sp>

</xml_diff>